<commit_message>
Adding Day 25 Code examples
</commit_message>
<xml_diff>
--- a/powerpoints/Day_25.pptx
+++ b/powerpoints/Day_25.pptx
@@ -28488,15 +28488,15 @@
             </a:pPr>
             <a:r>
               <a:rPr lang="en-US" dirty="0"/>
-              <a:t>Java Dates are created using a constructor which takes a long value. </a:t>
+              <a:t>Java Dates are created using a constructor which takes a long value. This value represents milliseconds since Jan 01</a:t>
             </a:r>
             <a:r>
-              <a:rPr lang="en-US" dirty="0" err="1"/>
-              <a:t>Thes</a:t>
+              <a:rPr lang="en-US"/>
+              <a:t>, 1970 </a:t>
             </a:r>
             <a:r>
               <a:rPr lang="en-US" dirty="0"/>
-              <a:t> value represents milliseconds since Jan 01, 1990 (based on the United States Naval Observatory Master clock).</a:t>
+              <a:t>(based on the United States Naval Observatory Master clock).</a:t>
             </a:r>
           </a:p>
           <a:p>
@@ -30760,7 +30760,7 @@
           <a:p>
             <a:r>
               <a:rPr lang="en-US" dirty="0"/>
-              <a:t>Maven is a tool that can be used for building and managing Java projects</a:t>
+              <a:t>Maven is a tool that can be used for building and managing programming projects</a:t>
             </a:r>
           </a:p>
           <a:p>

</xml_diff>